<commit_message>
Initial Commit of the Matplotlib based spatial data viewer
</commit_message>
<xml_diff>
--- a/Images/icons.pptx
+++ b/Images/icons.pptx
@@ -198,7 +198,7 @@
             <a:fld id="{EF2816C5-0349-4A2D-B307-BA35C9E33751}" type="datetimeFigureOut">
               <a:rPr lang="en-US" smtClean="0"/>
               <a:pPr/>
-              <a:t>10/11/2011</a:t>
+              <a:t>11/30/2011</a:t>
             </a:fld>
             <a:endParaRPr lang="en-US"/>
           </a:p>
@@ -1138,7 +1138,7 @@
             <a:fld id="{51AAF73F-098B-4C3D-8C64-6AF52AB2374C}" type="datetimeFigureOut">
               <a:rPr lang="en-US" smtClean="0"/>
               <a:pPr/>
-              <a:t>10/11/2011</a:t>
+              <a:t>11/30/2011</a:t>
             </a:fld>
             <a:endParaRPr lang="en-US"/>
           </a:p>
@@ -1305,7 +1305,7 @@
             <a:fld id="{51AAF73F-098B-4C3D-8C64-6AF52AB2374C}" type="datetimeFigureOut">
               <a:rPr lang="en-US" smtClean="0"/>
               <a:pPr/>
-              <a:t>10/11/2011</a:t>
+              <a:t>11/30/2011</a:t>
             </a:fld>
             <a:endParaRPr lang="en-US"/>
           </a:p>
@@ -1482,7 +1482,7 @@
             <a:fld id="{51AAF73F-098B-4C3D-8C64-6AF52AB2374C}" type="datetimeFigureOut">
               <a:rPr lang="en-US" smtClean="0"/>
               <a:pPr/>
-              <a:t>10/11/2011</a:t>
+              <a:t>11/30/2011</a:t>
             </a:fld>
             <a:endParaRPr lang="en-US"/>
           </a:p>
@@ -1649,7 +1649,7 @@
             <a:fld id="{51AAF73F-098B-4C3D-8C64-6AF52AB2374C}" type="datetimeFigureOut">
               <a:rPr lang="en-US" smtClean="0"/>
               <a:pPr/>
-              <a:t>10/11/2011</a:t>
+              <a:t>11/30/2011</a:t>
             </a:fld>
             <a:endParaRPr lang="en-US"/>
           </a:p>
@@ -1892,7 +1892,7 @@
             <a:fld id="{51AAF73F-098B-4C3D-8C64-6AF52AB2374C}" type="datetimeFigureOut">
               <a:rPr lang="en-US" smtClean="0"/>
               <a:pPr/>
-              <a:t>10/11/2011</a:t>
+              <a:t>11/30/2011</a:t>
             </a:fld>
             <a:endParaRPr lang="en-US"/>
           </a:p>
@@ -2177,7 +2177,7 @@
             <a:fld id="{51AAF73F-098B-4C3D-8C64-6AF52AB2374C}" type="datetimeFigureOut">
               <a:rPr lang="en-US" smtClean="0"/>
               <a:pPr/>
-              <a:t>10/11/2011</a:t>
+              <a:t>11/30/2011</a:t>
             </a:fld>
             <a:endParaRPr lang="en-US"/>
           </a:p>
@@ -2596,7 +2596,7 @@
             <a:fld id="{51AAF73F-098B-4C3D-8C64-6AF52AB2374C}" type="datetimeFigureOut">
               <a:rPr lang="en-US" smtClean="0"/>
               <a:pPr/>
-              <a:t>10/11/2011</a:t>
+              <a:t>11/30/2011</a:t>
             </a:fld>
             <a:endParaRPr lang="en-US"/>
           </a:p>
@@ -2711,7 +2711,7 @@
             <a:fld id="{51AAF73F-098B-4C3D-8C64-6AF52AB2374C}" type="datetimeFigureOut">
               <a:rPr lang="en-US" smtClean="0"/>
               <a:pPr/>
-              <a:t>10/11/2011</a:t>
+              <a:t>11/30/2011</a:t>
             </a:fld>
             <a:endParaRPr lang="en-US"/>
           </a:p>
@@ -2803,7 +2803,7 @@
             <a:fld id="{51AAF73F-098B-4C3D-8C64-6AF52AB2374C}" type="datetimeFigureOut">
               <a:rPr lang="en-US" smtClean="0"/>
               <a:pPr/>
-              <a:t>10/11/2011</a:t>
+              <a:t>11/30/2011</a:t>
             </a:fld>
             <a:endParaRPr lang="en-US"/>
           </a:p>
@@ -3077,7 +3077,7 @@
             <a:fld id="{51AAF73F-098B-4C3D-8C64-6AF52AB2374C}" type="datetimeFigureOut">
               <a:rPr lang="en-US" smtClean="0"/>
               <a:pPr/>
-              <a:t>10/11/2011</a:t>
+              <a:t>11/30/2011</a:t>
             </a:fld>
             <a:endParaRPr lang="en-US"/>
           </a:p>
@@ -3327,7 +3327,7 @@
             <a:fld id="{51AAF73F-098B-4C3D-8C64-6AF52AB2374C}" type="datetimeFigureOut">
               <a:rPr lang="en-US" smtClean="0"/>
               <a:pPr/>
-              <a:t>10/11/2011</a:t>
+              <a:t>11/30/2011</a:t>
             </a:fld>
             <a:endParaRPr lang="en-US"/>
           </a:p>
@@ -3537,7 +3537,7 @@
             <a:fld id="{51AAF73F-098B-4C3D-8C64-6AF52AB2374C}" type="datetimeFigureOut">
               <a:rPr lang="en-US" smtClean="0"/>
               <a:pPr/>
-              <a:t>10/11/2011</a:t>
+              <a:t>11/30/2011</a:t>
             </a:fld>
             <a:endParaRPr lang="en-US"/>
           </a:p>
@@ -3910,25 +3910,6 @@
       </p:grpSpPr>
       <p:sp>
         <p:nvSpPr>
-          <p:cNvPr id="3" name="Subtitle 2"/>
-          <p:cNvSpPr>
-            <a:spLocks noGrp="1"/>
-          </p:cNvSpPr>
-          <p:nvPr>
-            <p:ph type="subTitle" idx="1"/>
-          </p:nvPr>
-        </p:nvSpPr>
-        <p:spPr/>
-        <p:txBody>
-          <a:bodyPr/>
-          <a:lstStyle/>
-          <a:p>
-            <a:endParaRPr lang="en-US"/>
-          </a:p>
-        </p:txBody>
-      </p:sp>
-      <p:sp>
-        <p:nvSpPr>
           <p:cNvPr id="4" name="Rectangle 3"/>
           <p:cNvSpPr/>
           <p:nvPr/>
@@ -4249,6 +4230,208 @@
           <a:p>
             <a:pPr algn="ctr"/>
             <a:endParaRPr lang="en-US"/>
+          </a:p>
+        </p:txBody>
+      </p:sp>
+      <p:sp>
+        <p:nvSpPr>
+          <p:cNvPr id="12" name="Rectangle 11"/>
+          <p:cNvSpPr/>
+          <p:nvPr/>
+        </p:nvSpPr>
+        <p:spPr>
+          <a:xfrm>
+            <a:off x="5410200" y="2209800"/>
+            <a:ext cx="1828800" cy="1828800"/>
+          </a:xfrm>
+          <a:prstGeom prst="rect">
+            <a:avLst/>
+          </a:prstGeom>
+        </p:spPr>
+        <p:style>
+          <a:lnRef idx="2">
+            <a:schemeClr val="accent1"/>
+          </a:lnRef>
+          <a:fillRef idx="1">
+            <a:schemeClr val="lt1"/>
+          </a:fillRef>
+          <a:effectRef idx="0">
+            <a:schemeClr val="accent1"/>
+          </a:effectRef>
+          <a:fontRef idx="minor">
+            <a:schemeClr val="dk1"/>
+          </a:fontRef>
+        </p:style>
+        <p:txBody>
+          <a:bodyPr rtlCol="0" anchor="ctr"/>
+          <a:lstStyle/>
+          <a:p>
+            <a:pPr algn="ctr"/>
+            <a:endParaRPr lang="en-US"/>
+          </a:p>
+        </p:txBody>
+      </p:sp>
+      <p:sp>
+        <p:nvSpPr>
+          <p:cNvPr id="18" name="Rectangle 17"/>
+          <p:cNvSpPr/>
+          <p:nvPr/>
+        </p:nvSpPr>
+        <p:spPr>
+          <a:xfrm>
+            <a:off x="6248400" y="3429000"/>
+            <a:ext cx="914400" cy="830997"/>
+          </a:xfrm>
+          <a:prstGeom prst="rect">
+            <a:avLst/>
+          </a:prstGeom>
+          <a:noFill/>
+          <a:effectLst>
+            <a:outerShdw blurRad="76200" dist="12700" dir="2700000" sy="-23000" kx="-800400" algn="bl" rotWithShape="0">
+              <a:prstClr val="black">
+                <a:alpha val="20000"/>
+              </a:prstClr>
+            </a:outerShdw>
+          </a:effectLst>
+        </p:spPr>
+        <p:txBody>
+          <a:bodyPr wrap="square" lIns="91440" tIns="0" rIns="91440" bIns="0" anchor="b" anchorCtr="0">
+            <a:noAutofit/>
+          </a:bodyPr>
+          <a:lstStyle/>
+          <a:p>
+            <a:pPr algn="ctr"/>
+            <a:r>
+              <a:rPr lang="en-US" sz="12500" b="1" dirty="0" smtClean="0">
+                <a:ln w="12700">
+                  <a:solidFill>
+                    <a:schemeClr val="tx2">
+                      <a:satMod val="155000"/>
+                    </a:schemeClr>
+                  </a:solidFill>
+                  <a:prstDash val="solid"/>
+                </a:ln>
+                <a:solidFill>
+                  <a:schemeClr val="tx2">
+                    <a:lumMod val="40000"/>
+                    <a:lumOff val="60000"/>
+                  </a:schemeClr>
+                </a:solidFill>
+                <a:effectLst>
+                  <a:outerShdw blurRad="50800" dist="38100" dir="2700000" algn="tl" rotWithShape="0">
+                    <a:prstClr val="black">
+                      <a:alpha val="40000"/>
+                    </a:prstClr>
+                  </a:outerShdw>
+                </a:effectLst>
+              </a:rPr>
+              <a:t>L</a:t>
+            </a:r>
+            <a:endParaRPr lang="en-US" sz="12500" b="1" cap="none" spc="0" dirty="0" smtClean="0">
+              <a:ln w="12700">
+                <a:solidFill>
+                  <a:schemeClr val="tx2">
+                    <a:satMod val="155000"/>
+                  </a:schemeClr>
+                </a:solidFill>
+                <a:prstDash val="solid"/>
+              </a:ln>
+              <a:solidFill>
+                <a:schemeClr val="tx2">
+                  <a:lumMod val="40000"/>
+                  <a:lumOff val="60000"/>
+                </a:schemeClr>
+              </a:solidFill>
+              <a:effectLst>
+                <a:outerShdw blurRad="50800" dist="38100" dir="2700000" algn="tl" rotWithShape="0">
+                  <a:prstClr val="black">
+                    <a:alpha val="40000"/>
+                  </a:prstClr>
+                </a:outerShdw>
+              </a:effectLst>
+            </a:endParaRPr>
+          </a:p>
+        </p:txBody>
+      </p:sp>
+      <p:sp>
+        <p:nvSpPr>
+          <p:cNvPr id="19" name="Rectangle 18"/>
+          <p:cNvSpPr/>
+          <p:nvPr/>
+        </p:nvSpPr>
+        <p:spPr>
+          <a:xfrm>
+            <a:off x="5486400" y="2971800"/>
+            <a:ext cx="914400" cy="830997"/>
+          </a:xfrm>
+          <a:prstGeom prst="rect">
+            <a:avLst/>
+          </a:prstGeom>
+          <a:noFill/>
+          <a:effectLst>
+            <a:outerShdw blurRad="76200" dist="12700" dir="2700000" sy="-23000" kx="-800400" algn="bl" rotWithShape="0">
+              <a:prstClr val="black">
+                <a:alpha val="20000"/>
+              </a:prstClr>
+            </a:outerShdw>
+          </a:effectLst>
+        </p:spPr>
+        <p:txBody>
+          <a:bodyPr wrap="square" lIns="91440" tIns="0" rIns="91440" bIns="0" anchor="b" anchorCtr="0">
+            <a:noAutofit/>
+          </a:bodyPr>
+          <a:lstStyle/>
+          <a:p>
+            <a:pPr algn="ctr"/>
+            <a:r>
+              <a:rPr lang="en-US" sz="12500" b="1" dirty="0" smtClean="0">
+                <a:ln w="12700">
+                  <a:solidFill>
+                    <a:schemeClr val="tx2">
+                      <a:satMod val="155000"/>
+                    </a:schemeClr>
+                  </a:solidFill>
+                  <a:prstDash val="solid"/>
+                </a:ln>
+                <a:solidFill>
+                  <a:schemeClr val="tx2">
+                    <a:lumMod val="40000"/>
+                    <a:lumOff val="60000"/>
+                  </a:schemeClr>
+                </a:solidFill>
+                <a:effectLst>
+                  <a:outerShdw blurRad="50800" dist="38100" dir="2700000" algn="tl" rotWithShape="0">
+                    <a:prstClr val="black">
+                      <a:alpha val="40000"/>
+                    </a:prstClr>
+                  </a:outerShdw>
+                </a:effectLst>
+              </a:rPr>
+              <a:t>T</a:t>
+            </a:r>
+            <a:endParaRPr lang="en-US" sz="12500" b="1" cap="none" spc="0" dirty="0" smtClean="0">
+              <a:ln w="12700">
+                <a:solidFill>
+                  <a:schemeClr val="tx2">
+                    <a:satMod val="155000"/>
+                  </a:schemeClr>
+                </a:solidFill>
+                <a:prstDash val="solid"/>
+              </a:ln>
+              <a:solidFill>
+                <a:schemeClr val="tx2">
+                  <a:lumMod val="40000"/>
+                  <a:lumOff val="60000"/>
+                </a:schemeClr>
+              </a:solidFill>
+              <a:effectLst>
+                <a:outerShdw blurRad="50800" dist="38100" dir="2700000" algn="tl" rotWithShape="0">
+                  <a:prstClr val="black">
+                    <a:alpha val="40000"/>
+                  </a:prstClr>
+                </a:outerShdw>
+              </a:effectLst>
+            </a:endParaRPr>
           </a:p>
         </p:txBody>
       </p:sp>

</xml_diff>